<commit_message>
start of pipeline update
</commit_message>
<xml_diff>
--- a/progress/flowchart.pptx
+++ b/progress/flowchart.pptx
@@ -2980,38 +2980,8 @@
         </p:blipFill>
         <p:spPr>
           <a:xfrm>
-            <a:off x="4503558" y="2332667"/>
+            <a:off x="3934630" y="1567249"/>
             <a:ext cx="3478366" cy="2485463"/>
-          </a:xfrm>
-          <a:prstGeom prst="rect">
-            <a:avLst/>
-          </a:prstGeom>
-        </p:spPr>
-      </p:pic>
-      <p:pic>
-        <p:nvPicPr>
-          <p:cNvPr id="7" name="Picture 6"/>
-          <p:cNvPicPr>
-            <a:picLocks noChangeAspect="1"/>
-          </p:cNvPicPr>
-          <p:nvPr/>
-        </p:nvPicPr>
-        <p:blipFill>
-          <a:blip r:embed="rId3">
-            <a:extLst>
-              <a:ext uri="{28A0092B-C50C-407E-A947-70E740481C1C}">
-                <a14:useLocalDpi xmlns:a14="http://schemas.microsoft.com/office/drawing/2010/main" val="0"/>
-              </a:ext>
-            </a:extLst>
-          </a:blip>
-          <a:stretch>
-            <a:fillRect/>
-          </a:stretch>
-        </p:blipFill>
-        <p:spPr>
-          <a:xfrm>
-            <a:off x="4627555" y="16349"/>
-            <a:ext cx="2988194" cy="1687776"/>
           </a:xfrm>
           <a:prstGeom prst="rect">
             <a:avLst/>
@@ -3026,8 +2996,8 @@
         </p:nvGrpSpPr>
         <p:grpSpPr>
           <a:xfrm>
-            <a:off x="212868" y="96285"/>
-            <a:ext cx="3468603" cy="1249922"/>
+            <a:off x="406611" y="16349"/>
+            <a:ext cx="2490117" cy="1013282"/>
             <a:chOff x="388882" y="705666"/>
             <a:chExt cx="3277480" cy="1135117"/>
           </a:xfrm>
@@ -3161,451 +3131,16 @@
       </p:grpSp>
       <p:grpSp>
         <p:nvGrpSpPr>
-          <p:cNvPr id="11" name="Group 10"/>
-          <p:cNvGrpSpPr/>
-          <p:nvPr/>
-        </p:nvGrpSpPr>
-        <p:grpSpPr>
-          <a:xfrm>
-            <a:off x="583323" y="3177970"/>
-            <a:ext cx="1457856" cy="281554"/>
-            <a:chOff x="959803" y="736590"/>
-            <a:chExt cx="2974427" cy="1136425"/>
-          </a:xfrm>
-        </p:grpSpPr>
-        <p:sp>
-          <p:nvSpPr>
-            <p:cNvPr id="12" name="Flowchart: Alternate Process 11"/>
-            <p:cNvSpPr/>
-            <p:nvPr/>
-          </p:nvSpPr>
-          <p:spPr>
-            <a:xfrm>
-              <a:off x="959803" y="737898"/>
-              <a:ext cx="2974427" cy="1135117"/>
-            </a:xfrm>
-            <a:prstGeom prst="flowChartAlternateProcess">
-              <a:avLst/>
-            </a:prstGeom>
-          </p:spPr>
-          <p:style>
-            <a:lnRef idx="2">
-              <a:schemeClr val="accent1">
-                <a:shade val="50000"/>
-              </a:schemeClr>
-            </a:lnRef>
-            <a:fillRef idx="1">
-              <a:schemeClr val="accent1"/>
-            </a:fillRef>
-            <a:effectRef idx="0">
-              <a:schemeClr val="accent1"/>
-            </a:effectRef>
-            <a:fontRef idx="minor">
-              <a:schemeClr val="lt1"/>
-            </a:fontRef>
-          </p:style>
-          <p:txBody>
-            <a:bodyPr rtlCol="0" anchor="ctr"/>
-            <a:lstStyle/>
-            <a:p>
-              <a:pPr algn="ctr"/>
-              <a:endParaRPr lang="en-US"/>
-            </a:p>
-          </p:txBody>
-        </p:sp>
-        <p:sp>
-          <p:nvSpPr>
-            <p:cNvPr id="13" name="TextBox 12"/>
-            <p:cNvSpPr txBox="1"/>
-            <p:nvPr/>
-          </p:nvSpPr>
-          <p:spPr>
-            <a:xfrm>
-              <a:off x="1206795" y="736590"/>
-              <a:ext cx="2480442" cy="647811"/>
-            </a:xfrm>
-            <a:prstGeom prst="rect">
-              <a:avLst/>
-            </a:prstGeom>
-            <a:noFill/>
-          </p:spPr>
-          <p:txBody>
-            <a:bodyPr wrap="square" rtlCol="0">
-              <a:spAutoFit/>
-            </a:bodyPr>
-            <a:lstStyle/>
-            <a:p>
-              <a:pPr algn="ctr"/>
-              <a:r>
-                <a:rPr lang="en-US" sz="1200" dirty="0" smtClean="0"/>
-                <a:t>Ajordan86(f</a:t>
-              </a:r>
-              <a:r>
-                <a:rPr lang="en-US" sz="1050" dirty="0" smtClean="0"/>
-                <a:t>q.gz</a:t>
-              </a:r>
-              <a:r>
-                <a:rPr lang="en-US" sz="1200" dirty="0" smtClean="0"/>
-                <a:t>)</a:t>
-              </a:r>
-              <a:endParaRPr lang="en-US" sz="1200" dirty="0"/>
-            </a:p>
-          </p:txBody>
-        </p:sp>
-      </p:grpSp>
-      <p:grpSp>
-        <p:nvGrpSpPr>
-          <p:cNvPr id="24" name="Group 23"/>
-          <p:cNvGrpSpPr/>
-          <p:nvPr/>
-        </p:nvGrpSpPr>
-        <p:grpSpPr>
-          <a:xfrm>
-            <a:off x="583322" y="3498824"/>
-            <a:ext cx="1457856" cy="281554"/>
-            <a:chOff x="959803" y="736590"/>
-            <a:chExt cx="2974427" cy="1136425"/>
-          </a:xfrm>
-        </p:grpSpPr>
-        <p:sp>
-          <p:nvSpPr>
-            <p:cNvPr id="25" name="Flowchart: Alternate Process 24"/>
-            <p:cNvSpPr/>
-            <p:nvPr/>
-          </p:nvSpPr>
-          <p:spPr>
-            <a:xfrm>
-              <a:off x="959803" y="737898"/>
-              <a:ext cx="2974427" cy="1135117"/>
-            </a:xfrm>
-            <a:prstGeom prst="flowChartAlternateProcess">
-              <a:avLst/>
-            </a:prstGeom>
-          </p:spPr>
-          <p:style>
-            <a:lnRef idx="2">
-              <a:schemeClr val="accent1">
-                <a:shade val="50000"/>
-              </a:schemeClr>
-            </a:lnRef>
-            <a:fillRef idx="1">
-              <a:schemeClr val="accent1"/>
-            </a:fillRef>
-            <a:effectRef idx="0">
-              <a:schemeClr val="accent1"/>
-            </a:effectRef>
-            <a:fontRef idx="minor">
-              <a:schemeClr val="lt1"/>
-            </a:fontRef>
-          </p:style>
-          <p:txBody>
-            <a:bodyPr rtlCol="0" anchor="ctr"/>
-            <a:lstStyle/>
-            <a:p>
-              <a:pPr algn="ctr"/>
-              <a:endParaRPr lang="en-US"/>
-            </a:p>
-          </p:txBody>
-        </p:sp>
-        <p:sp>
-          <p:nvSpPr>
-            <p:cNvPr id="26" name="TextBox 25"/>
-            <p:cNvSpPr txBox="1"/>
-            <p:nvPr/>
-          </p:nvSpPr>
-          <p:spPr>
-            <a:xfrm>
-              <a:off x="1022852" y="736590"/>
-              <a:ext cx="2664387" cy="1118040"/>
-            </a:xfrm>
-            <a:prstGeom prst="rect">
-              <a:avLst/>
-            </a:prstGeom>
-            <a:noFill/>
-          </p:spPr>
-          <p:txBody>
-            <a:bodyPr wrap="square" rtlCol="0">
-              <a:spAutoFit/>
-            </a:bodyPr>
-            <a:lstStyle/>
-            <a:p>
-              <a:pPr algn="ctr"/>
-              <a:r>
-                <a:rPr lang="en-US" sz="1200" dirty="0" smtClean="0"/>
-                <a:t>Cmelanu89</a:t>
-              </a:r>
-              <a:r>
-                <a:rPr lang="en-US" sz="1200" dirty="0" smtClean="0"/>
-                <a:t>(fq.gz)</a:t>
-              </a:r>
-              <a:endParaRPr lang="en-US" sz="1200" dirty="0"/>
-            </a:p>
-          </p:txBody>
-        </p:sp>
-      </p:grpSp>
-      <p:grpSp>
-        <p:nvGrpSpPr>
-          <p:cNvPr id="27" name="Group 26"/>
-          <p:cNvGrpSpPr/>
-          <p:nvPr/>
-        </p:nvGrpSpPr>
-        <p:grpSpPr>
-          <a:xfrm>
-            <a:off x="583321" y="3820002"/>
-            <a:ext cx="1457856" cy="281554"/>
-            <a:chOff x="959803" y="736590"/>
-            <a:chExt cx="2974427" cy="1136425"/>
-          </a:xfrm>
-        </p:grpSpPr>
-        <p:sp>
-          <p:nvSpPr>
-            <p:cNvPr id="28" name="Flowchart: Alternate Process 27"/>
-            <p:cNvSpPr/>
-            <p:nvPr/>
-          </p:nvSpPr>
-          <p:spPr>
-            <a:xfrm>
-              <a:off x="959803" y="737898"/>
-              <a:ext cx="2974427" cy="1135117"/>
-            </a:xfrm>
-            <a:prstGeom prst="flowChartAlternateProcess">
-              <a:avLst/>
-            </a:prstGeom>
-          </p:spPr>
-          <p:style>
-            <a:lnRef idx="2">
-              <a:schemeClr val="accent1">
-                <a:shade val="50000"/>
-              </a:schemeClr>
-            </a:lnRef>
-            <a:fillRef idx="1">
-              <a:schemeClr val="accent1"/>
-            </a:fillRef>
-            <a:effectRef idx="0">
-              <a:schemeClr val="accent1"/>
-            </a:effectRef>
-            <a:fontRef idx="minor">
-              <a:schemeClr val="lt1"/>
-            </a:fontRef>
-          </p:style>
-          <p:txBody>
-            <a:bodyPr rtlCol="0" anchor="ctr"/>
-            <a:lstStyle/>
-            <a:p>
-              <a:pPr algn="ctr"/>
-              <a:endParaRPr lang="en-US"/>
-            </a:p>
-          </p:txBody>
-        </p:sp>
-        <p:sp>
-          <p:nvSpPr>
-            <p:cNvPr id="29" name="TextBox 28"/>
-            <p:cNvSpPr txBox="1"/>
-            <p:nvPr/>
-          </p:nvSpPr>
-          <p:spPr>
-            <a:xfrm>
-              <a:off x="1022852" y="736590"/>
-              <a:ext cx="2664389" cy="1118040"/>
-            </a:xfrm>
-            <a:prstGeom prst="rect">
-              <a:avLst/>
-            </a:prstGeom>
-            <a:noFill/>
-          </p:spPr>
-          <p:txBody>
-            <a:bodyPr wrap="square" rtlCol="0">
-              <a:spAutoFit/>
-            </a:bodyPr>
-            <a:lstStyle/>
-            <a:p>
-              <a:pPr algn="ctr"/>
-              <a:r>
-                <a:rPr lang="en-US" sz="1200" dirty="0" smtClean="0"/>
-                <a:t>Lflorae666(fq.gz)</a:t>
-              </a:r>
-              <a:endParaRPr lang="en-US" sz="1200" dirty="0"/>
-            </a:p>
-          </p:txBody>
-        </p:sp>
-      </p:grpSp>
-      <p:grpSp>
-        <p:nvGrpSpPr>
-          <p:cNvPr id="30" name="Group 29"/>
-          <p:cNvGrpSpPr/>
-          <p:nvPr/>
-        </p:nvGrpSpPr>
-        <p:grpSpPr>
-          <a:xfrm>
-            <a:off x="614223" y="4341302"/>
-            <a:ext cx="1457856" cy="281554"/>
-            <a:chOff x="959803" y="736590"/>
-            <a:chExt cx="2974427" cy="1136425"/>
-          </a:xfrm>
-        </p:grpSpPr>
-        <p:sp>
-          <p:nvSpPr>
-            <p:cNvPr id="31" name="Flowchart: Alternate Process 30"/>
-            <p:cNvSpPr/>
-            <p:nvPr/>
-          </p:nvSpPr>
-          <p:spPr>
-            <a:xfrm>
-              <a:off x="959803" y="737898"/>
-              <a:ext cx="2974427" cy="1135117"/>
-            </a:xfrm>
-            <a:prstGeom prst="flowChartAlternateProcess">
-              <a:avLst/>
-            </a:prstGeom>
-          </p:spPr>
-          <p:style>
-            <a:lnRef idx="2">
-              <a:schemeClr val="accent1">
-                <a:shade val="50000"/>
-              </a:schemeClr>
-            </a:lnRef>
-            <a:fillRef idx="1">
-              <a:schemeClr val="accent1"/>
-            </a:fillRef>
-            <a:effectRef idx="0">
-              <a:schemeClr val="accent1"/>
-            </a:effectRef>
-            <a:fontRef idx="minor">
-              <a:schemeClr val="lt1"/>
-            </a:fontRef>
-          </p:style>
-          <p:txBody>
-            <a:bodyPr rtlCol="0" anchor="ctr"/>
-            <a:lstStyle/>
-            <a:p>
-              <a:pPr algn="ctr"/>
-              <a:endParaRPr lang="en-US"/>
-            </a:p>
-          </p:txBody>
-        </p:sp>
-        <p:sp>
-          <p:nvSpPr>
-            <p:cNvPr id="32" name="TextBox 31"/>
-            <p:cNvSpPr txBox="1"/>
-            <p:nvPr/>
-          </p:nvSpPr>
-          <p:spPr>
-            <a:xfrm>
-              <a:off x="1143750" y="736590"/>
-              <a:ext cx="2543486" cy="1118040"/>
-            </a:xfrm>
-            <a:prstGeom prst="rect">
-              <a:avLst/>
-            </a:prstGeom>
-            <a:noFill/>
-          </p:spPr>
-          <p:txBody>
-            <a:bodyPr wrap="square" rtlCol="0">
-              <a:spAutoFit/>
-            </a:bodyPr>
-            <a:lstStyle/>
-            <a:p>
-              <a:pPr algn="ctr"/>
-              <a:r>
-                <a:rPr lang="en-US" sz="1200" dirty="0" err="1" smtClean="0"/>
-                <a:t>Rattenuatu</a:t>
-              </a:r>
-              <a:r>
-                <a:rPr lang="en-US" sz="1200" dirty="0" smtClean="0"/>
-                <a:t>(f</a:t>
-              </a:r>
-              <a:r>
-                <a:rPr lang="en-US" sz="1050" dirty="0" smtClean="0"/>
-                <a:t>q.gz</a:t>
-              </a:r>
-              <a:r>
-                <a:rPr lang="en-US" sz="1200" dirty="0" smtClean="0"/>
-                <a:t>)</a:t>
-              </a:r>
-              <a:endParaRPr lang="en-US" sz="1200" dirty="0"/>
-            </a:p>
-          </p:txBody>
-        </p:sp>
-      </p:grpSp>
-      <p:sp>
-        <p:nvSpPr>
-          <p:cNvPr id="33" name="TextBox 32"/>
-          <p:cNvSpPr txBox="1"/>
-          <p:nvPr/>
-        </p:nvSpPr>
-        <p:spPr>
-          <a:xfrm>
-            <a:off x="1107297" y="3922245"/>
-            <a:ext cx="409903" cy="461665"/>
-          </a:xfrm>
-          <a:prstGeom prst="rect">
-            <a:avLst/>
-          </a:prstGeom>
-          <a:noFill/>
-        </p:spPr>
-        <p:txBody>
-          <a:bodyPr wrap="square" rtlCol="0">
-            <a:spAutoFit/>
-          </a:bodyPr>
-          <a:lstStyle/>
-          <a:p>
-            <a:r>
-              <a:rPr lang="en-US" sz="2400" b="1" dirty="0" smtClean="0"/>
-              <a:t>…</a:t>
-            </a:r>
-          </a:p>
-        </p:txBody>
-      </p:sp>
-      <p:sp>
-        <p:nvSpPr>
-          <p:cNvPr id="34" name="Right Brace 33"/>
-          <p:cNvSpPr/>
-          <p:nvPr/>
-        </p:nvSpPr>
-        <p:spPr>
-          <a:xfrm>
-            <a:off x="2115495" y="3177970"/>
-            <a:ext cx="437144" cy="1440331"/>
-          </a:xfrm>
-          <a:prstGeom prst="rightBrace">
-            <a:avLst/>
-          </a:prstGeom>
-        </p:spPr>
-        <p:style>
-          <a:lnRef idx="1">
-            <a:schemeClr val="dk1"/>
-          </a:lnRef>
-          <a:fillRef idx="0">
-            <a:schemeClr val="dk1"/>
-          </a:fillRef>
-          <a:effectRef idx="0">
-            <a:schemeClr val="dk1"/>
-          </a:effectRef>
-          <a:fontRef idx="minor">
-            <a:schemeClr val="tx1"/>
-          </a:fontRef>
-        </p:style>
-        <p:txBody>
-          <a:bodyPr rtlCol="0" anchor="ctr"/>
-          <a:lstStyle/>
-          <a:p>
-            <a:pPr algn="ctr"/>
-            <a:endParaRPr lang="en-US"/>
-          </a:p>
-        </p:txBody>
-      </p:sp>
-      <p:grpSp>
-        <p:nvGrpSpPr>
           <p:cNvPr id="35" name="Group 34"/>
           <p:cNvGrpSpPr/>
           <p:nvPr/>
         </p:nvGrpSpPr>
         <p:grpSpPr>
           <a:xfrm>
-            <a:off x="294300" y="6298654"/>
-            <a:ext cx="3099057" cy="426935"/>
-            <a:chOff x="959803" y="737894"/>
-            <a:chExt cx="3011305" cy="2453089"/>
+            <a:off x="399580" y="3885006"/>
+            <a:ext cx="2339069" cy="536638"/>
+            <a:chOff x="996681" y="790623"/>
+            <a:chExt cx="3022950" cy="2453089"/>
           </a:xfrm>
         </p:grpSpPr>
         <p:sp>
@@ -3616,7 +3151,7 @@
           </p:nvSpPr>
           <p:spPr>
             <a:xfrm>
-              <a:off x="959803" y="737894"/>
+              <a:off x="1045204" y="790623"/>
               <a:ext cx="2974427" cy="2453089"/>
             </a:xfrm>
             <a:prstGeom prst="flowChartAlternateProcess">
@@ -3656,8 +3191,8 @@
           </p:nvSpPr>
           <p:spPr>
             <a:xfrm>
-              <a:off x="996681" y="1221381"/>
-              <a:ext cx="2974427" cy="1591585"/>
+              <a:off x="996681" y="1221382"/>
+              <a:ext cx="2974427" cy="1700527"/>
             </a:xfrm>
             <a:prstGeom prst="rect">
               <a:avLst/>
@@ -3673,7 +3208,14 @@
               <a:pPr algn="ctr"/>
               <a:r>
                 <a:rPr lang="en-US" sz="1200" dirty="0" smtClean="0"/>
-                <a:t>Directory with 44 fq.gz files. 1e5&lt;n-reads&lt;2e6</a:t>
+                <a:t>Directory with 44 fq.gz files.</a:t>
+              </a:r>
+            </a:p>
+            <a:p>
+              <a:pPr algn="ctr"/>
+              <a:r>
+                <a:rPr lang="en-US" sz="1200" dirty="0" smtClean="0"/>
+                <a:t> 1e5&lt;n-reads&lt;2e6</a:t>
               </a:r>
               <a:endParaRPr lang="en-US" sz="1200" dirty="0"/>
             </a:p>
@@ -3688,7 +3230,7 @@
         </p:nvSpPr>
         <p:spPr>
           <a:xfrm>
-            <a:off x="1517200" y="1731410"/>
+            <a:off x="731769" y="1141204"/>
             <a:ext cx="2089834" cy="584775"/>
           </a:xfrm>
           <a:prstGeom prst="rect">
@@ -3730,7 +3272,7 @@
         </p:nvSpPr>
         <p:spPr>
           <a:xfrm>
-            <a:off x="1249992" y="4887145"/>
+            <a:off x="700778" y="2756110"/>
             <a:ext cx="2105411" cy="830997"/>
           </a:xfrm>
           <a:prstGeom prst="rect">
@@ -3751,92 +3293,6 @@
           </a:p>
         </p:txBody>
       </p:sp>
-      <p:grpSp>
-        <p:nvGrpSpPr>
-          <p:cNvPr id="41" name="Group 40"/>
-          <p:cNvGrpSpPr/>
-          <p:nvPr/>
-        </p:nvGrpSpPr>
-        <p:grpSpPr>
-          <a:xfrm>
-            <a:off x="2639472" y="3553245"/>
-            <a:ext cx="1041999" cy="787701"/>
-            <a:chOff x="959803" y="737894"/>
-            <a:chExt cx="2974427" cy="2453089"/>
-          </a:xfrm>
-        </p:grpSpPr>
-        <p:sp>
-          <p:nvSpPr>
-            <p:cNvPr id="42" name="Flowchart: Alternate Process 41"/>
-            <p:cNvSpPr/>
-            <p:nvPr/>
-          </p:nvSpPr>
-          <p:spPr>
-            <a:xfrm>
-              <a:off x="959803" y="737894"/>
-              <a:ext cx="2974427" cy="2453089"/>
-            </a:xfrm>
-            <a:prstGeom prst="flowChartAlternateProcess">
-              <a:avLst/>
-            </a:prstGeom>
-          </p:spPr>
-          <p:style>
-            <a:lnRef idx="2">
-              <a:schemeClr val="accent1">
-                <a:shade val="50000"/>
-              </a:schemeClr>
-            </a:lnRef>
-            <a:fillRef idx="1">
-              <a:schemeClr val="accent1"/>
-            </a:fillRef>
-            <a:effectRef idx="0">
-              <a:schemeClr val="accent1"/>
-            </a:effectRef>
-            <a:fontRef idx="minor">
-              <a:schemeClr val="lt1"/>
-            </a:fontRef>
-          </p:style>
-          <p:txBody>
-            <a:bodyPr rtlCol="0" anchor="ctr"/>
-            <a:lstStyle/>
-            <a:p>
-              <a:pPr algn="ctr"/>
-              <a:endParaRPr lang="en-US"/>
-            </a:p>
-          </p:txBody>
-        </p:sp>
-        <p:sp>
-          <p:nvSpPr>
-            <p:cNvPr id="43" name="TextBox 42"/>
-            <p:cNvSpPr txBox="1"/>
-            <p:nvPr/>
-          </p:nvSpPr>
-          <p:spPr>
-            <a:xfrm>
-              <a:off x="959803" y="1034382"/>
-              <a:ext cx="2974427" cy="1437735"/>
-            </a:xfrm>
-            <a:prstGeom prst="rect">
-              <a:avLst/>
-            </a:prstGeom>
-            <a:noFill/>
-          </p:spPr>
-          <p:txBody>
-            <a:bodyPr wrap="square" rtlCol="0">
-              <a:spAutoFit/>
-            </a:bodyPr>
-            <a:lstStyle/>
-            <a:p>
-              <a:pPr algn="ctr"/>
-              <a:r>
-                <a:rPr lang="en-US" sz="1200" dirty="0" smtClean="0"/>
-                <a:t>1 fq.gz per specimen (48 total)</a:t>
-              </a:r>
-              <a:endParaRPr lang="en-US" sz="1200" dirty="0"/>
-            </a:p>
-          </p:txBody>
-        </p:sp>
-      </p:grpSp>
       <p:cxnSp>
         <p:nvCxnSpPr>
           <p:cNvPr id="45" name="Straight Arrow Connector 44"/>
@@ -3844,9 +3300,9 @@
           <p:nvPr/>
         </p:nvCxnSpPr>
         <p:spPr>
-          <a:xfrm>
-            <a:off x="1132028" y="1426349"/>
-            <a:ext cx="0" cy="1588806"/>
+          <a:xfrm flipH="1">
+            <a:off x="568985" y="1069609"/>
+            <a:ext cx="7421" cy="962010"/>
           </a:xfrm>
           <a:prstGeom prst="straightConnector1">
             <a:avLst/>
@@ -3881,8 +3337,8 @@
         </p:nvCxnSpPr>
         <p:spPr>
           <a:xfrm>
-            <a:off x="1132028" y="4618301"/>
-            <a:ext cx="0" cy="1588806"/>
+            <a:off x="546302" y="2695862"/>
+            <a:ext cx="0" cy="1104959"/>
           </a:xfrm>
           <a:prstGeom prst="straightConnector1">
             <a:avLst/>
@@ -3917,10 +3373,10 @@
         </p:nvGrpSpPr>
         <p:grpSpPr>
           <a:xfrm>
-            <a:off x="3607034" y="729501"/>
-            <a:ext cx="1035371" cy="5815643"/>
+            <a:off x="3102244" y="346841"/>
+            <a:ext cx="891687" cy="6148087"/>
             <a:chOff x="3607034" y="729501"/>
-            <a:chExt cx="1669159" cy="5815643"/>
+            <a:chExt cx="1437521" cy="5815643"/>
           </a:xfrm>
         </p:grpSpPr>
         <p:grpSp>
@@ -4016,8 +3472,8 @@
           </p:nvCxnSpPr>
           <p:spPr>
             <a:xfrm flipV="1">
-              <a:off x="3996776" y="756738"/>
-              <a:ext cx="1279417" cy="1"/>
+              <a:off x="3996776" y="756739"/>
+              <a:ext cx="1047779" cy="1"/>
             </a:xfrm>
             <a:prstGeom prst="straightConnector1">
               <a:avLst/>
@@ -4045,75 +3501,6 @@
           </p:style>
         </p:cxnSp>
       </p:grpSp>
-      <p:sp>
-        <p:nvSpPr>
-          <p:cNvPr id="77" name="TextBox 76"/>
-          <p:cNvSpPr txBox="1"/>
-          <p:nvPr/>
-        </p:nvSpPr>
-        <p:spPr>
-          <a:xfrm>
-            <a:off x="3531051" y="110088"/>
-            <a:ext cx="1020521" cy="523220"/>
-          </a:xfrm>
-          <a:prstGeom prst="rect">
-            <a:avLst/>
-          </a:prstGeom>
-          <a:noFill/>
-        </p:spPr>
-        <p:txBody>
-          <a:bodyPr wrap="square" rtlCol="0">
-            <a:spAutoFit/>
-          </a:bodyPr>
-          <a:lstStyle/>
-          <a:p>
-            <a:pPr algn="r"/>
-            <a:r>
-              <a:rPr lang="en-US" sz="1400" dirty="0" smtClean="0"/>
-              <a:t>Stacks pipeline</a:t>
-            </a:r>
-            <a:endParaRPr lang="en-US" sz="1400" dirty="0"/>
-          </a:p>
-        </p:txBody>
-      </p:sp>
-      <p:sp>
-        <p:nvSpPr>
-          <p:cNvPr id="78" name="TextBox 77"/>
-          <p:cNvSpPr txBox="1"/>
-          <p:nvPr/>
-        </p:nvSpPr>
-        <p:spPr>
-          <a:xfrm>
-            <a:off x="7615749" y="142091"/>
-            <a:ext cx="1050177" cy="1323439"/>
-          </a:xfrm>
-          <a:prstGeom prst="rect">
-            <a:avLst/>
-          </a:prstGeom>
-          <a:noFill/>
-        </p:spPr>
-        <p:txBody>
-          <a:bodyPr wrap="square" rtlCol="0">
-            <a:spAutoFit/>
-          </a:bodyPr>
-          <a:lstStyle/>
-          <a:p>
-            <a:r>
-              <a:rPr lang="en-US" sz="1600" dirty="0" smtClean="0"/>
-              <a:t>Run `</a:t>
-            </a:r>
-            <a:r>
-              <a:rPr lang="en-US" sz="1600" dirty="0" err="1" smtClean="0"/>
-              <a:t>ustacks</a:t>
-            </a:r>
-            <a:r>
-              <a:rPr lang="en-US" sz="1600" dirty="0" smtClean="0"/>
-              <a:t>` on each sample to find loci</a:t>
-            </a:r>
-            <a:endParaRPr lang="en-US" sz="1600" dirty="0"/>
-          </a:p>
-        </p:txBody>
-      </p:sp>
       <p:cxnSp>
         <p:nvCxnSpPr>
           <p:cNvPr id="79" name="Straight Arrow Connector 78"/>
@@ -4122,7 +3509,7 @@
         </p:nvCxnSpPr>
         <p:spPr>
           <a:xfrm>
-            <a:off x="4822033" y="1881910"/>
+            <a:off x="4249366" y="965382"/>
             <a:ext cx="0" cy="580689"/>
           </a:xfrm>
           <a:prstGeom prst="straightConnector1">
@@ -4158,7 +3545,7 @@
         </p:nvSpPr>
         <p:spPr>
           <a:xfrm>
-            <a:off x="4962871" y="1730383"/>
+            <a:off x="4376164" y="930708"/>
             <a:ext cx="3198559" cy="584775"/>
           </a:xfrm>
           <a:prstGeom prst="rect">
@@ -4190,13 +3577,13 @@
       </p:sp>
       <p:sp>
         <p:nvSpPr>
-          <p:cNvPr id="85" name="TextBox 84"/>
+          <p:cNvPr id="87" name="TextBox 86"/>
           <p:cNvSpPr txBox="1"/>
           <p:nvPr/>
         </p:nvSpPr>
         <p:spPr>
           <a:xfrm>
-            <a:off x="4743352" y="1610364"/>
+            <a:off x="4080361" y="3925434"/>
             <a:ext cx="2869324" cy="215444"/>
           </a:xfrm>
           <a:prstGeom prst="rect">
@@ -4216,7 +3603,7 @@
             </a:r>
             <a:r>
               <a:rPr lang="en-US" sz="800" dirty="0" smtClean="0">
-                <a:hlinkClick r:id="rId4"/>
+                <a:hlinkClick r:id="rId3"/>
               </a:rPr>
               <a:t>http://catchenlab.life.illinois.edu/stacks/param_tut.php</a:t>
             </a:r>
@@ -4224,78 +3611,6 @@
           </a:p>
         </p:txBody>
       </p:sp>
-      <p:sp>
-        <p:nvSpPr>
-          <p:cNvPr id="87" name="TextBox 86"/>
-          <p:cNvSpPr txBox="1"/>
-          <p:nvPr/>
-        </p:nvSpPr>
-        <p:spPr>
-          <a:xfrm>
-            <a:off x="4743352" y="4746752"/>
-            <a:ext cx="2869324" cy="215444"/>
-          </a:xfrm>
-          <a:prstGeom prst="rect">
-            <a:avLst/>
-          </a:prstGeom>
-          <a:noFill/>
-        </p:spPr>
-        <p:txBody>
-          <a:bodyPr wrap="square" rtlCol="0">
-            <a:spAutoFit/>
-          </a:bodyPr>
-          <a:lstStyle/>
-          <a:p>
-            <a:r>
-              <a:rPr lang="en-US" sz="800" dirty="0" smtClean="0"/>
-              <a:t>Figure  </a:t>
-            </a:r>
-            <a:r>
-              <a:rPr lang="en-US" sz="800" dirty="0" smtClean="0">
-                <a:hlinkClick r:id="rId4"/>
-              </a:rPr>
-              <a:t>http://catchenlab.life.illinois.edu/stacks/param_tut.php</a:t>
-            </a:r>
-            <a:endParaRPr lang="en-US" sz="800" dirty="0"/>
-          </a:p>
-        </p:txBody>
-      </p:sp>
-      <p:cxnSp>
-        <p:nvCxnSpPr>
-          <p:cNvPr id="88" name="Straight Arrow Connector 87"/>
-          <p:cNvCxnSpPr/>
-          <p:nvPr/>
-        </p:nvCxnSpPr>
-        <p:spPr>
-          <a:xfrm>
-            <a:off x="4743352" y="4962196"/>
-            <a:ext cx="0" cy="580689"/>
-          </a:xfrm>
-          <a:prstGeom prst="straightConnector1">
-            <a:avLst/>
-          </a:prstGeom>
-          <a:ln w="76200">
-            <a:solidFill>
-              <a:schemeClr val="tx1"/>
-            </a:solidFill>
-            <a:tailEnd type="triangle"/>
-          </a:ln>
-        </p:spPr>
-        <p:style>
-          <a:lnRef idx="3">
-            <a:schemeClr val="dk1"/>
-          </a:lnRef>
-          <a:fillRef idx="0">
-            <a:schemeClr val="dk1"/>
-          </a:fillRef>
-          <a:effectRef idx="2">
-            <a:schemeClr val="dk1"/>
-          </a:effectRef>
-          <a:fontRef idx="minor">
-            <a:schemeClr val="tx1"/>
-          </a:fontRef>
-        </p:style>
-      </p:cxnSp>
       <p:grpSp>
         <p:nvGrpSpPr>
           <p:cNvPr id="89" name="Group 88"/>
@@ -4304,8 +3619,8 @@
         </p:nvGrpSpPr>
         <p:grpSpPr>
           <a:xfrm>
-            <a:off x="4513619" y="5588210"/>
-            <a:ext cx="3099057" cy="1139858"/>
+            <a:off x="4118314" y="4174495"/>
+            <a:ext cx="3099057" cy="460712"/>
             <a:chOff x="959803" y="737894"/>
             <a:chExt cx="3011305" cy="6549410"/>
           </a:xfrm>
@@ -4359,7 +3674,7 @@
           <p:spPr>
             <a:xfrm>
               <a:off x="996681" y="1221381"/>
-              <a:ext cx="2974427" cy="5835809"/>
+              <a:ext cx="2974427" cy="2652640"/>
             </a:xfrm>
             <a:prstGeom prst="rect">
               <a:avLst/>
@@ -4391,28 +3706,15 @@
               </a:r>
               <a:r>
                 <a:rPr lang="en-US" sz="1200" dirty="0" smtClean="0"/>
-                <a:t> output data (Name.tags.tsv.gz,</a:t>
+                <a:t> output data (same format as </a:t>
               </a:r>
-            </a:p>
-            <a:p>
-              <a:pPr algn="ctr"/>
+              <a:r>
+                <a:rPr lang="en-US" sz="1200" dirty="0" err="1" smtClean="0"/>
+                <a:t>ustack</a:t>
+              </a:r>
               <a:r>
                 <a:rPr lang="en-US" sz="1200" dirty="0" smtClean="0"/>
-                <a:t>Name.snps.tsv.gz,</a:t>
-              </a:r>
-            </a:p>
-            <a:p>
-              <a:pPr algn="ctr"/>
-              <a:r>
-                <a:rPr lang="en-US" sz="1200" dirty="0" smtClean="0"/>
-                <a:t>Name.alleles.tsv.gz</a:t>
-              </a:r>
-            </a:p>
-            <a:p>
-              <a:pPr algn="ctr"/>
-              <a:r>
-                <a:rPr lang="en-US" sz="1200" dirty="0" smtClean="0"/>
-                <a:t>&amp; Catalog.tags.tsv.gz…)</a:t>
+                <a:t> but name is Catalog)</a:t>
               </a:r>
               <a:endParaRPr lang="en-US" sz="1200" dirty="0"/>
             </a:p>
@@ -4427,8 +3729,8 @@
         </p:nvSpPr>
         <p:spPr>
           <a:xfrm>
-            <a:off x="5001917" y="4938212"/>
-            <a:ext cx="3446002" cy="584775"/>
+            <a:off x="4417142" y="4727600"/>
+            <a:ext cx="2995854" cy="584775"/>
           </a:xfrm>
           <a:prstGeom prst="rect">
             <a:avLst/>
@@ -4447,194 +3749,11 @@
             </a:r>
             <a:r>
               <a:rPr lang="en-US" sz="1600" dirty="0" err="1" smtClean="0"/>
-              <a:t>csstacks</a:t>
+              <a:t>sstacks</a:t>
             </a:r>
             <a:r>
               <a:rPr lang="en-US" sz="1600" dirty="0" smtClean="0"/>
-              <a:t>` on all samples to </a:t>
-            </a:r>
-            <a:r>
-              <a:rPr lang="en-US" sz="1600" dirty="0" err="1" smtClean="0"/>
-              <a:t>algin</a:t>
-            </a:r>
-            <a:r>
-              <a:rPr lang="en-US" sz="1600" dirty="0" smtClean="0"/>
-              <a:t> against the catalog</a:t>
-            </a:r>
-            <a:endParaRPr lang="en-US" sz="1600" dirty="0"/>
-          </a:p>
-        </p:txBody>
-      </p:sp>
-      <p:grpSp>
-        <p:nvGrpSpPr>
-          <p:cNvPr id="94" name="Group 93"/>
-          <p:cNvGrpSpPr/>
-          <p:nvPr/>
-        </p:nvGrpSpPr>
-        <p:grpSpPr>
-          <a:xfrm>
-            <a:off x="7767145" y="645423"/>
-            <a:ext cx="1744717" cy="5815643"/>
-            <a:chOff x="2648294" y="729501"/>
-            <a:chExt cx="2812720" cy="5815643"/>
-          </a:xfrm>
-        </p:grpSpPr>
-        <p:grpSp>
-          <p:nvGrpSpPr>
-            <p:cNvPr id="95" name="Group 94"/>
-            <p:cNvGrpSpPr/>
-            <p:nvPr/>
-          </p:nvGrpSpPr>
-          <p:grpSpPr>
-            <a:xfrm>
-              <a:off x="2648294" y="729501"/>
-              <a:ext cx="1371362" cy="5815643"/>
-              <a:chOff x="2648294" y="729501"/>
-              <a:chExt cx="1371362" cy="5815643"/>
-            </a:xfrm>
-          </p:grpSpPr>
-          <p:cxnSp>
-            <p:nvCxnSpPr>
-              <p:cNvPr id="97" name="Straight Connector 96"/>
-              <p:cNvCxnSpPr/>
-              <p:nvPr/>
-            </p:nvCxnSpPr>
-            <p:spPr>
-              <a:xfrm>
-                <a:off x="2648294" y="6512121"/>
-                <a:ext cx="1371362" cy="0"/>
-              </a:xfrm>
-              <a:prstGeom prst="line">
-                <a:avLst/>
-              </a:prstGeom>
-              <a:ln w="76200">
-                <a:solidFill>
-                  <a:schemeClr val="tx1"/>
-                </a:solidFill>
-              </a:ln>
-            </p:spPr>
-            <p:style>
-              <a:lnRef idx="1">
-                <a:schemeClr val="accent1"/>
-              </a:lnRef>
-              <a:fillRef idx="0">
-                <a:schemeClr val="accent1"/>
-              </a:fillRef>
-              <a:effectRef idx="0">
-                <a:schemeClr val="accent1"/>
-              </a:effectRef>
-              <a:fontRef idx="minor">
-                <a:schemeClr val="tx1"/>
-              </a:fontRef>
-            </p:style>
-          </p:cxnSp>
-          <p:cxnSp>
-            <p:nvCxnSpPr>
-              <p:cNvPr id="98" name="Straight Connector 97"/>
-              <p:cNvCxnSpPr/>
-              <p:nvPr/>
-            </p:nvCxnSpPr>
-            <p:spPr>
-              <a:xfrm flipV="1">
-                <a:off x="4013850" y="729501"/>
-                <a:ext cx="0" cy="5815643"/>
-              </a:xfrm>
-              <a:prstGeom prst="line">
-                <a:avLst/>
-              </a:prstGeom>
-              <a:ln w="76200">
-                <a:solidFill>
-                  <a:schemeClr val="tx1"/>
-                </a:solidFill>
-              </a:ln>
-            </p:spPr>
-            <p:style>
-              <a:lnRef idx="1">
-                <a:schemeClr val="accent1"/>
-              </a:lnRef>
-              <a:fillRef idx="0">
-                <a:schemeClr val="accent1"/>
-              </a:fillRef>
-              <a:effectRef idx="0">
-                <a:schemeClr val="accent1"/>
-              </a:effectRef>
-              <a:fontRef idx="minor">
-                <a:schemeClr val="tx1"/>
-              </a:fontRef>
-            </p:style>
-          </p:cxnSp>
-        </p:grpSp>
-        <p:cxnSp>
-          <p:nvCxnSpPr>
-            <p:cNvPr id="96" name="Straight Arrow Connector 95"/>
-            <p:cNvCxnSpPr/>
-            <p:nvPr/>
-          </p:nvCxnSpPr>
-          <p:spPr>
-            <a:xfrm flipV="1">
-              <a:off x="3996776" y="737173"/>
-              <a:ext cx="1464238" cy="19567"/>
-            </a:xfrm>
-            <a:prstGeom prst="straightConnector1">
-              <a:avLst/>
-            </a:prstGeom>
-            <a:ln w="76200">
-              <a:solidFill>
-                <a:schemeClr val="tx1"/>
-              </a:solidFill>
-              <a:tailEnd type="triangle"/>
-            </a:ln>
-          </p:spPr>
-          <p:style>
-            <a:lnRef idx="3">
-              <a:schemeClr val="dk1"/>
-            </a:lnRef>
-            <a:fillRef idx="0">
-              <a:schemeClr val="dk1"/>
-            </a:fillRef>
-            <a:effectRef idx="2">
-              <a:schemeClr val="dk1"/>
-            </a:effectRef>
-            <a:fontRef idx="minor">
-              <a:schemeClr val="tx1"/>
-            </a:fontRef>
-          </p:style>
-        </p:cxnSp>
-      </p:grpSp>
-      <p:sp>
-        <p:nvSpPr>
-          <p:cNvPr id="99" name="TextBox 98"/>
-          <p:cNvSpPr txBox="1"/>
-          <p:nvPr/>
-        </p:nvSpPr>
-        <p:spPr>
-          <a:xfrm>
-            <a:off x="8161430" y="-67729"/>
-            <a:ext cx="1220937" cy="769441"/>
-          </a:xfrm>
-          <a:prstGeom prst="rect">
-            <a:avLst/>
-          </a:prstGeom>
-          <a:noFill/>
-        </p:spPr>
-        <p:txBody>
-          <a:bodyPr wrap="square" rtlCol="0">
-            <a:spAutoFit/>
-          </a:bodyPr>
-          <a:lstStyle/>
-          <a:p>
-            <a:pPr algn="r"/>
-            <a:r>
-              <a:rPr lang="en-US" sz="1400" dirty="0" smtClean="0"/>
-              <a:t>Stacks pipeline (</a:t>
-            </a:r>
-            <a:r>
-              <a:rPr lang="en-US" sz="1400" dirty="0" err="1" smtClean="0"/>
-              <a:t>cont</a:t>
-            </a:r>
-            <a:r>
-              <a:rPr lang="en-US" sz="1600" dirty="0" smtClean="0"/>
-              <a:t>)</a:t>
+              <a:t>` on all samples to align against the catalog</a:t>
             </a:r>
             <a:endParaRPr lang="en-US" sz="1600" dirty="0"/>
           </a:p>
@@ -4648,15 +3767,406 @@
         </p:nvGrpSpPr>
         <p:grpSpPr>
           <a:xfrm>
-            <a:off x="9533706" y="427574"/>
-            <a:ext cx="2488588" cy="537808"/>
-            <a:chOff x="959803" y="737894"/>
-            <a:chExt cx="3011305" cy="6549410"/>
+            <a:off x="4057464" y="5643012"/>
+            <a:ext cx="3065147" cy="825130"/>
+            <a:chOff x="967990" y="411556"/>
+            <a:chExt cx="2984759" cy="6614543"/>
           </a:xfrm>
         </p:grpSpPr>
         <p:sp>
           <p:nvSpPr>
             <p:cNvPr id="104" name="Flowchart: Alternate Process 103"/>
+            <p:cNvSpPr/>
+            <p:nvPr/>
+          </p:nvSpPr>
+          <p:spPr>
+            <a:xfrm>
+              <a:off x="967990" y="411556"/>
+              <a:ext cx="2974427" cy="6549410"/>
+            </a:xfrm>
+            <a:prstGeom prst="flowChartAlternateProcess">
+              <a:avLst/>
+            </a:prstGeom>
+          </p:spPr>
+          <p:style>
+            <a:lnRef idx="2">
+              <a:schemeClr val="accent1">
+                <a:shade val="50000"/>
+              </a:schemeClr>
+            </a:lnRef>
+            <a:fillRef idx="1">
+              <a:schemeClr val="accent1"/>
+            </a:fillRef>
+            <a:effectRef idx="0">
+              <a:schemeClr val="accent1"/>
+            </a:effectRef>
+            <a:fontRef idx="minor">
+              <a:schemeClr val="lt1"/>
+            </a:fontRef>
+          </p:style>
+          <p:txBody>
+            <a:bodyPr rtlCol="0" anchor="ctr"/>
+            <a:lstStyle/>
+            <a:p>
+              <a:pPr algn="ctr"/>
+              <a:endParaRPr lang="en-US"/>
+            </a:p>
+          </p:txBody>
+        </p:sp>
+        <p:sp>
+          <p:nvSpPr>
+            <p:cNvPr id="105" name="TextBox 104"/>
+            <p:cNvSpPr txBox="1"/>
+            <p:nvPr/>
+          </p:nvSpPr>
+          <p:spPr>
+            <a:xfrm>
+              <a:off x="978322" y="1844874"/>
+              <a:ext cx="2974427" cy="5181225"/>
+            </a:xfrm>
+            <a:prstGeom prst="rect">
+              <a:avLst/>
+            </a:prstGeom>
+            <a:noFill/>
+          </p:spPr>
+          <p:txBody>
+            <a:bodyPr wrap="square" rtlCol="0">
+              <a:spAutoFit/>
+            </a:bodyPr>
+            <a:lstStyle/>
+            <a:p>
+              <a:pPr algn="ctr"/>
+              <a:r>
+                <a:rPr lang="en-US" sz="1200" dirty="0" smtClean="0"/>
+                <a:t>Adds </a:t>
+              </a:r>
+              <a:r>
+                <a:rPr lang="en-US" sz="1200" dirty="0" err="1" smtClean="0"/>
+                <a:t>sstacks</a:t>
+              </a:r>
+              <a:r>
+                <a:rPr lang="en-US" sz="1200" dirty="0" smtClean="0"/>
+                <a:t> output data to same directory as </a:t>
+              </a:r>
+              <a:r>
+                <a:rPr lang="en-US" sz="1200" dirty="0" err="1" smtClean="0"/>
+                <a:t>ustacks</a:t>
+              </a:r>
+              <a:r>
+                <a:rPr lang="en-US" sz="1200" dirty="0" smtClean="0"/>
+                <a:t> and </a:t>
+              </a:r>
+              <a:r>
+                <a:rPr lang="en-US" sz="1200" dirty="0" err="1" smtClean="0"/>
+                <a:t>ccstacks</a:t>
+              </a:r>
+              <a:r>
+                <a:rPr lang="en-US" sz="1200" dirty="0" smtClean="0"/>
+                <a:t> data (name.matches.tsv.gz)</a:t>
+              </a:r>
+              <a:endParaRPr lang="en-US" sz="1200" dirty="0"/>
+            </a:p>
+          </p:txBody>
+        </p:sp>
+      </p:grpSp>
+      <p:cxnSp>
+        <p:nvCxnSpPr>
+          <p:cNvPr id="107" name="Straight Arrow Connector 106"/>
+          <p:cNvCxnSpPr/>
+          <p:nvPr/>
+        </p:nvCxnSpPr>
+        <p:spPr>
+          <a:xfrm flipH="1">
+            <a:off x="4249366" y="4744196"/>
+            <a:ext cx="14611" cy="830536"/>
+          </a:xfrm>
+          <a:prstGeom prst="straightConnector1">
+            <a:avLst/>
+          </a:prstGeom>
+          <a:ln w="76200">
+            <a:solidFill>
+              <a:schemeClr val="tx1"/>
+            </a:solidFill>
+            <a:tailEnd type="triangle"/>
+          </a:ln>
+        </p:spPr>
+        <p:style>
+          <a:lnRef idx="3">
+            <a:schemeClr val="dk1"/>
+          </a:lnRef>
+          <a:fillRef idx="0">
+            <a:schemeClr val="dk1"/>
+          </a:fillRef>
+          <a:effectRef idx="2">
+            <a:schemeClr val="dk1"/>
+          </a:effectRef>
+          <a:fontRef idx="minor">
+            <a:schemeClr val="tx1"/>
+          </a:fontRef>
+        </p:style>
+      </p:cxnSp>
+      <p:sp>
+        <p:nvSpPr>
+          <p:cNvPr id="108" name="TextBox 107"/>
+          <p:cNvSpPr txBox="1"/>
+          <p:nvPr/>
+        </p:nvSpPr>
+        <p:spPr>
+          <a:xfrm>
+            <a:off x="8245842" y="104929"/>
+            <a:ext cx="2436469" cy="830997"/>
+          </a:xfrm>
+          <a:prstGeom prst="rect">
+            <a:avLst/>
+          </a:prstGeom>
+          <a:noFill/>
+        </p:spPr>
+        <p:txBody>
+          <a:bodyPr wrap="square" rtlCol="0">
+            <a:spAutoFit/>
+          </a:bodyPr>
+          <a:lstStyle/>
+          <a:p>
+            <a:r>
+              <a:rPr lang="en-US" sz="1600" dirty="0" smtClean="0"/>
+              <a:t>Run `tsv2bam` to transpose data to a </a:t>
+            </a:r>
+            <a:r>
+              <a:rPr lang="en-US" sz="1600" smtClean="0"/>
+              <a:t>bam alignment by  </a:t>
+            </a:r>
+            <a:endParaRPr lang="en-US" sz="1600" dirty="0"/>
+          </a:p>
+        </p:txBody>
+      </p:sp>
+      <p:sp>
+        <p:nvSpPr>
+          <p:cNvPr id="113" name="Flowchart: Alternate Process 112"/>
+          <p:cNvSpPr/>
+          <p:nvPr/>
+        </p:nvSpPr>
+        <p:spPr>
+          <a:xfrm>
+            <a:off x="370832" y="2055851"/>
+            <a:ext cx="2313888" cy="546411"/>
+          </a:xfrm>
+          <a:prstGeom prst="flowChartAlternateProcess">
+            <a:avLst/>
+          </a:prstGeom>
+        </p:spPr>
+        <p:style>
+          <a:lnRef idx="2">
+            <a:schemeClr val="accent1">
+              <a:shade val="50000"/>
+            </a:schemeClr>
+          </a:lnRef>
+          <a:fillRef idx="1">
+            <a:schemeClr val="accent1"/>
+          </a:fillRef>
+          <a:effectRef idx="0">
+            <a:schemeClr val="accent1"/>
+          </a:effectRef>
+          <a:fontRef idx="minor">
+            <a:schemeClr val="lt1"/>
+          </a:fontRef>
+        </p:style>
+        <p:txBody>
+          <a:bodyPr rtlCol="0" anchor="ctr"/>
+          <a:lstStyle/>
+          <a:p>
+            <a:pPr algn="ctr"/>
+            <a:endParaRPr lang="en-US"/>
+          </a:p>
+        </p:txBody>
+      </p:sp>
+      <p:sp>
+        <p:nvSpPr>
+          <p:cNvPr id="114" name="TextBox 113"/>
+          <p:cNvSpPr txBox="1"/>
+          <p:nvPr/>
+        </p:nvSpPr>
+        <p:spPr>
+          <a:xfrm>
+            <a:off x="384488" y="2150012"/>
+            <a:ext cx="2442468" cy="461665"/>
+          </a:xfrm>
+          <a:prstGeom prst="rect">
+            <a:avLst/>
+          </a:prstGeom>
+          <a:noFill/>
+        </p:spPr>
+        <p:txBody>
+          <a:bodyPr wrap="square" rtlCol="0">
+            <a:spAutoFit/>
+          </a:bodyPr>
+          <a:lstStyle/>
+          <a:p>
+            <a:pPr algn="ctr"/>
+            <a:r>
+              <a:rPr lang="en-US" sz="1200" dirty="0" smtClean="0"/>
+              <a:t>Directory with 48 fq.gz files, 1 per specimen</a:t>
+            </a:r>
+            <a:endParaRPr lang="en-US" sz="1200" dirty="0"/>
+          </a:p>
+        </p:txBody>
+      </p:sp>
+      <p:pic>
+        <p:nvPicPr>
+          <p:cNvPr id="115" name="Picture 114"/>
+          <p:cNvPicPr>
+            <a:picLocks noChangeAspect="1"/>
+          </p:cNvPicPr>
+          <p:nvPr/>
+        </p:nvPicPr>
+        <p:blipFill>
+          <a:blip r:embed="rId4">
+            <a:extLst>
+              <a:ext uri="{28A0092B-C50C-407E-A947-70E740481C1C}">
+                <a14:useLocalDpi xmlns:a14="http://schemas.microsoft.com/office/drawing/2010/main" val="0"/>
+              </a:ext>
+            </a:extLst>
+          </a:blip>
+          <a:stretch>
+            <a:fillRect/>
+          </a:stretch>
+        </p:blipFill>
+        <p:spPr>
+          <a:xfrm>
+            <a:off x="40411" y="4938212"/>
+            <a:ext cx="2988194" cy="1687776"/>
+          </a:xfrm>
+          <a:prstGeom prst="rect">
+            <a:avLst/>
+          </a:prstGeom>
+        </p:spPr>
+      </p:pic>
+      <p:sp>
+        <p:nvSpPr>
+          <p:cNvPr id="116" name="TextBox 115"/>
+          <p:cNvSpPr txBox="1"/>
+          <p:nvPr/>
+        </p:nvSpPr>
+        <p:spPr>
+          <a:xfrm>
+            <a:off x="770587" y="4515877"/>
+            <a:ext cx="2268609" cy="584775"/>
+          </a:xfrm>
+          <a:prstGeom prst="rect">
+            <a:avLst/>
+          </a:prstGeom>
+          <a:noFill/>
+        </p:spPr>
+        <p:txBody>
+          <a:bodyPr wrap="square" rtlCol="0">
+            <a:spAutoFit/>
+          </a:bodyPr>
+          <a:lstStyle/>
+          <a:p>
+            <a:r>
+              <a:rPr lang="en-US" sz="1600" dirty="0" smtClean="0"/>
+              <a:t>Run `</a:t>
+            </a:r>
+            <a:r>
+              <a:rPr lang="en-US" sz="1600" dirty="0" err="1" smtClean="0"/>
+              <a:t>ustacks</a:t>
+            </a:r>
+            <a:r>
+              <a:rPr lang="en-US" sz="1600" dirty="0" smtClean="0"/>
+              <a:t>` on each sample to find loci</a:t>
+            </a:r>
+            <a:endParaRPr lang="en-US" sz="1600" dirty="0"/>
+          </a:p>
+        </p:txBody>
+      </p:sp>
+      <p:sp>
+        <p:nvSpPr>
+          <p:cNvPr id="117" name="TextBox 116"/>
+          <p:cNvSpPr txBox="1"/>
+          <p:nvPr/>
+        </p:nvSpPr>
+        <p:spPr>
+          <a:xfrm>
+            <a:off x="156208" y="6532227"/>
+            <a:ext cx="2869324" cy="215444"/>
+          </a:xfrm>
+          <a:prstGeom prst="rect">
+            <a:avLst/>
+          </a:prstGeom>
+          <a:noFill/>
+        </p:spPr>
+        <p:txBody>
+          <a:bodyPr wrap="square" rtlCol="0">
+            <a:spAutoFit/>
+          </a:bodyPr>
+          <a:lstStyle/>
+          <a:p>
+            <a:r>
+              <a:rPr lang="en-US" sz="800" dirty="0" smtClean="0"/>
+              <a:t>Figure  </a:t>
+            </a:r>
+            <a:r>
+              <a:rPr lang="en-US" sz="800" dirty="0" smtClean="0">
+                <a:hlinkClick r:id="rId3"/>
+              </a:rPr>
+              <a:t>http://catchenlab.life.illinois.edu/stacks/param_tut.php</a:t>
+            </a:r>
+            <a:endParaRPr lang="en-US" sz="800" dirty="0"/>
+          </a:p>
+        </p:txBody>
+      </p:sp>
+      <p:cxnSp>
+        <p:nvCxnSpPr>
+          <p:cNvPr id="118" name="Straight Arrow Connector 117"/>
+          <p:cNvCxnSpPr/>
+          <p:nvPr/>
+        </p:nvCxnSpPr>
+        <p:spPr>
+          <a:xfrm>
+            <a:off x="568985" y="4498428"/>
+            <a:ext cx="7421" cy="491537"/>
+          </a:xfrm>
+          <a:prstGeom prst="straightConnector1">
+            <a:avLst/>
+          </a:prstGeom>
+          <a:ln w="76200">
+            <a:solidFill>
+              <a:schemeClr val="tx1"/>
+            </a:solidFill>
+            <a:tailEnd type="triangle"/>
+          </a:ln>
+        </p:spPr>
+        <p:style>
+          <a:lnRef idx="3">
+            <a:schemeClr val="dk1"/>
+          </a:lnRef>
+          <a:fillRef idx="0">
+            <a:schemeClr val="dk1"/>
+          </a:fillRef>
+          <a:effectRef idx="2">
+            <a:schemeClr val="dk1"/>
+          </a:effectRef>
+          <a:fontRef idx="minor">
+            <a:schemeClr val="tx1"/>
+          </a:fontRef>
+        </p:style>
+      </p:cxnSp>
+      <p:grpSp>
+        <p:nvGrpSpPr>
+          <p:cNvPr id="121" name="Group 120"/>
+          <p:cNvGrpSpPr/>
+          <p:nvPr/>
+        </p:nvGrpSpPr>
+        <p:grpSpPr>
+          <a:xfrm>
+            <a:off x="4080361" y="75494"/>
+            <a:ext cx="3099057" cy="841420"/>
+            <a:chOff x="959803" y="737894"/>
+            <a:chExt cx="3011305" cy="6549410"/>
+          </a:xfrm>
+        </p:grpSpPr>
+        <p:sp>
+          <p:nvSpPr>
+            <p:cNvPr id="122" name="Flowchart: Alternate Process 121"/>
             <p:cNvSpPr/>
             <p:nvPr/>
           </p:nvSpPr>
@@ -4696,14 +4206,14 @@
         </p:sp>
         <p:sp>
           <p:nvSpPr>
-            <p:cNvPr id="105" name="TextBox 104"/>
+            <p:cNvPr id="123" name="TextBox 122"/>
             <p:cNvSpPr txBox="1"/>
             <p:nvPr/>
           </p:nvSpPr>
           <p:spPr>
             <a:xfrm>
               <a:off x="996681" y="1221381"/>
-              <a:ext cx="2974427" cy="2652640"/>
+              <a:ext cx="2974427" cy="4774753"/>
             </a:xfrm>
             <a:prstGeom prst="rect">
               <a:avLst/>
@@ -4723,87 +4233,166 @@
               </a:r>
               <a:r>
                 <a:rPr lang="en-US" sz="1200" dirty="0" err="1" smtClean="0"/>
-                <a:t>sstacks</a:t>
+                <a:t>ustacks</a:t>
               </a:r>
               <a:r>
                 <a:rPr lang="en-US" sz="1200" dirty="0" smtClean="0"/>
-                <a:t> output data (name.matches.tsv.gz)</a:t>
+                <a:t> output (Name.tags.tsv.gz,</a:t>
               </a:r>
-              <a:endParaRPr lang="en-US" sz="1200" dirty="0"/>
+            </a:p>
+            <a:p>
+              <a:pPr algn="ctr"/>
+              <a:r>
+                <a:rPr lang="en-US" sz="1200" dirty="0" smtClean="0"/>
+                <a:t>Name.snps.tsv.gz,</a:t>
+              </a:r>
+            </a:p>
+            <a:p>
+              <a:pPr algn="ctr"/>
+              <a:r>
+                <a:rPr lang="en-US" sz="1200" dirty="0" smtClean="0"/>
+                <a:t>Name.alleles.tsv.gz</a:t>
+              </a:r>
             </a:p>
           </p:txBody>
         </p:sp>
       </p:grpSp>
-      <p:cxnSp>
-        <p:nvCxnSpPr>
-          <p:cNvPr id="107" name="Straight Arrow Connector 106"/>
-          <p:cNvCxnSpPr/>
+      <p:grpSp>
+        <p:nvGrpSpPr>
+          <p:cNvPr id="126" name="Group 125"/>
+          <p:cNvGrpSpPr/>
           <p:nvPr/>
-        </p:nvCxnSpPr>
-        <p:spPr>
+        </p:nvGrpSpPr>
+        <p:grpSpPr>
           <a:xfrm>
-            <a:off x="9541121" y="1205346"/>
-            <a:ext cx="0" cy="580689"/>
-          </a:xfrm>
-          <a:prstGeom prst="straightConnector1">
-            <a:avLst/>
-          </a:prstGeom>
-          <a:ln w="76200">
-            <a:solidFill>
+            <a:off x="7354156" y="240900"/>
+            <a:ext cx="891687" cy="5950380"/>
+            <a:chOff x="3607034" y="729501"/>
+            <a:chExt cx="1437521" cy="5815643"/>
+          </a:xfrm>
+        </p:grpSpPr>
+        <p:grpSp>
+          <p:nvGrpSpPr>
+            <p:cNvPr id="127" name="Group 126"/>
+            <p:cNvGrpSpPr/>
+            <p:nvPr/>
+          </p:nvGrpSpPr>
+          <p:grpSpPr>
+            <a:xfrm>
+              <a:off x="3607034" y="729501"/>
+              <a:ext cx="412622" cy="5815643"/>
+              <a:chOff x="3607034" y="729501"/>
+              <a:chExt cx="412622" cy="5815643"/>
+            </a:xfrm>
+          </p:grpSpPr>
+          <p:cxnSp>
+            <p:nvCxnSpPr>
+              <p:cNvPr id="129" name="Straight Connector 128"/>
+              <p:cNvCxnSpPr/>
+              <p:nvPr/>
+            </p:nvCxnSpPr>
+            <p:spPr>
+              <a:xfrm>
+                <a:off x="3607034" y="6512121"/>
+                <a:ext cx="412622" cy="0"/>
+              </a:xfrm>
+              <a:prstGeom prst="line">
+                <a:avLst/>
+              </a:prstGeom>
+              <a:ln w="76200">
+                <a:solidFill>
+                  <a:schemeClr val="tx1"/>
+                </a:solidFill>
+              </a:ln>
+            </p:spPr>
+            <p:style>
+              <a:lnRef idx="1">
+                <a:schemeClr val="accent1"/>
+              </a:lnRef>
+              <a:fillRef idx="0">
+                <a:schemeClr val="accent1"/>
+              </a:fillRef>
+              <a:effectRef idx="0">
+                <a:schemeClr val="accent1"/>
+              </a:effectRef>
+              <a:fontRef idx="minor">
+                <a:schemeClr val="tx1"/>
+              </a:fontRef>
+            </p:style>
+          </p:cxnSp>
+          <p:cxnSp>
+            <p:nvCxnSpPr>
+              <p:cNvPr id="130" name="Straight Connector 129"/>
+              <p:cNvCxnSpPr/>
+              <p:nvPr/>
+            </p:nvCxnSpPr>
+            <p:spPr>
+              <a:xfrm flipV="1">
+                <a:off x="4013850" y="729501"/>
+                <a:ext cx="0" cy="5815643"/>
+              </a:xfrm>
+              <a:prstGeom prst="line">
+                <a:avLst/>
+              </a:prstGeom>
+              <a:ln w="76200">
+                <a:solidFill>
+                  <a:schemeClr val="tx1"/>
+                </a:solidFill>
+              </a:ln>
+            </p:spPr>
+            <p:style>
+              <a:lnRef idx="1">
+                <a:schemeClr val="accent1"/>
+              </a:lnRef>
+              <a:fillRef idx="0">
+                <a:schemeClr val="accent1"/>
+              </a:fillRef>
+              <a:effectRef idx="0">
+                <a:schemeClr val="accent1"/>
+              </a:effectRef>
+              <a:fontRef idx="minor">
+                <a:schemeClr val="tx1"/>
+              </a:fontRef>
+            </p:style>
+          </p:cxnSp>
+        </p:grpSp>
+        <p:cxnSp>
+          <p:nvCxnSpPr>
+            <p:cNvPr id="128" name="Straight Arrow Connector 127"/>
+            <p:cNvCxnSpPr/>
+            <p:nvPr/>
+          </p:nvCxnSpPr>
+          <p:spPr>
+            <a:xfrm flipV="1">
+              <a:off x="3996776" y="756739"/>
+              <a:ext cx="1047779" cy="1"/>
+            </a:xfrm>
+            <a:prstGeom prst="straightConnector1">
+              <a:avLst/>
+            </a:prstGeom>
+            <a:ln w="76200">
+              <a:solidFill>
+                <a:schemeClr val="tx1"/>
+              </a:solidFill>
+              <a:tailEnd type="triangle"/>
+            </a:ln>
+          </p:spPr>
+          <p:style>
+            <a:lnRef idx="3">
+              <a:schemeClr val="dk1"/>
+            </a:lnRef>
+            <a:fillRef idx="0">
+              <a:schemeClr val="dk1"/>
+            </a:fillRef>
+            <a:effectRef idx="2">
+              <a:schemeClr val="dk1"/>
+            </a:effectRef>
+            <a:fontRef idx="minor">
               <a:schemeClr val="tx1"/>
-            </a:solidFill>
-            <a:tailEnd type="triangle"/>
-          </a:ln>
-        </p:spPr>
-        <p:style>
-          <a:lnRef idx="3">
-            <a:schemeClr val="dk1"/>
-          </a:lnRef>
-          <a:fillRef idx="0">
-            <a:schemeClr val="dk1"/>
-          </a:fillRef>
-          <a:effectRef idx="2">
-            <a:schemeClr val="dk1"/>
-          </a:effectRef>
-          <a:fontRef idx="minor">
-            <a:schemeClr val="tx1"/>
-          </a:fontRef>
-        </p:style>
-      </p:cxnSp>
-      <p:sp>
-        <p:nvSpPr>
-          <p:cNvPr id="108" name="TextBox 107"/>
-          <p:cNvSpPr txBox="1"/>
-          <p:nvPr/>
-        </p:nvSpPr>
-        <p:spPr>
-          <a:xfrm>
-            <a:off x="9681959" y="1053819"/>
-            <a:ext cx="2436469" cy="338554"/>
-          </a:xfrm>
-          <a:prstGeom prst="rect">
-            <a:avLst/>
-          </a:prstGeom>
-          <a:noFill/>
-        </p:spPr>
-        <p:txBody>
-          <a:bodyPr wrap="square" rtlCol="0">
-            <a:spAutoFit/>
-          </a:bodyPr>
-          <a:lstStyle/>
-          <a:p>
-            <a:r>
-              <a:rPr lang="en-US" sz="1600" dirty="0" smtClean="0"/>
-              <a:t>Run </a:t>
-            </a:r>
-            <a:r>
-              <a:rPr lang="en-US" sz="1600" smtClean="0"/>
-              <a:t>`populations` to </a:t>
-            </a:r>
-            <a:endParaRPr lang="en-US" sz="1600" dirty="0"/>
-          </a:p>
-        </p:txBody>
-      </p:sp>
+            </a:fontRef>
+          </p:style>
+        </p:cxnSp>
+      </p:grpSp>
     </p:spTree>
     <p:extLst>
       <p:ext uri="{BB962C8B-B14F-4D97-AF65-F5344CB8AC3E}">

</xml_diff>

<commit_message>
Removing accidentally cloned repo
</commit_message>
<xml_diff>
--- a/progress/flowchart.pptx
+++ b/progress/flowchart.pptx
@@ -16,7 +16,6 @@
     <p:sldId id="270" r:id="rId10"/>
     <p:sldId id="271" r:id="rId11"/>
     <p:sldId id="269" r:id="rId12"/>
-    <p:sldId id="262" r:id="rId13"/>
   </p:sldIdLst>
   <p:sldSz cx="12192000" cy="6858000"/>
   <p:notesSz cx="6858000" cy="9144000"/>
@@ -2996,10 +2995,17 @@
           <a:lstStyle/>
           <a:p>
             <a:r>
-              <a:rPr lang="en-US" dirty="0" smtClean="0"/>
-              <a:t>Title of Some Sort</a:t>
-            </a:r>
-            <a:endParaRPr lang="en-US" dirty="0"/>
+              <a:rPr lang="en-US" b="1" dirty="0"/>
+              <a:t>Analyzing </a:t>
+            </a:r>
+            <a:r>
+              <a:rPr lang="en-US" b="1" dirty="0" err="1"/>
+              <a:t>RADSeq</a:t>
+            </a:r>
+            <a:r>
+              <a:rPr lang="en-US" b="1" dirty="0"/>
+              <a:t> Data</a:t>
+            </a:r>
           </a:p>
         </p:txBody>
       </p:sp>
@@ -3042,6 +3048,13 @@
   <p:clrMapOvr>
     <a:masterClrMapping/>
   </p:clrMapOvr>
+  <p:timing>
+    <p:tnLst>
+      <p:par>
+        <p:cTn id="1" dur="indefinite" restart="never" nodeType="tmRoot"/>
+      </p:par>
+    </p:tnLst>
+  </p:timing>
 </p:sld>
 </file>
 
@@ -3154,6 +3167,13 @@
   <p:clrMapOvr>
     <a:masterClrMapping/>
   </p:clrMapOvr>
+  <p:timing>
+    <p:tnLst>
+      <p:par>
+        <p:cTn id="1" dur="indefinite" restart="never" nodeType="tmRoot"/>
+      </p:par>
+    </p:tnLst>
+  </p:timing>
 </p:sld>
 </file>
 
@@ -3374,13 +3394,15 @@
       <p:cxnSp>
         <p:nvCxnSpPr>
           <p:cNvPr id="79" name="Straight Arrow Connector 78"/>
-          <p:cNvCxnSpPr/>
+          <p:cNvCxnSpPr>
+            <a:endCxn id="4" idx="1"/>
+          </p:cNvCxnSpPr>
           <p:nvPr/>
         </p:nvCxnSpPr>
         <p:spPr>
           <a:xfrm>
-            <a:off x="2204105" y="1140707"/>
-            <a:ext cx="1449016" cy="5301"/>
+            <a:off x="2135029" y="989939"/>
+            <a:ext cx="1517279" cy="5963"/>
           </a:xfrm>
           <a:prstGeom prst="straightConnector1">
             <a:avLst/>
@@ -3705,7 +3727,7 @@
         </p:nvGrpSpPr>
         <p:grpSpPr>
           <a:xfrm>
-            <a:off x="253045" y="658244"/>
+            <a:off x="191110" y="489261"/>
             <a:ext cx="1883570" cy="1146441"/>
             <a:chOff x="957657" y="411556"/>
             <a:chExt cx="2984760" cy="6549410"/>
@@ -3880,44 +3902,22 @@
             <a:p>
               <a:pPr algn="ctr"/>
               <a:r>
-                <a:rPr lang="en-US" sz="1600" dirty="0" smtClean="0"/>
+                <a:rPr lang="en-US" sz="1600" dirty="0" smtClean="0">
+                  <a:solidFill>
+                    <a:schemeClr val="bg1"/>
+                  </a:solidFill>
+                </a:rPr>
                 <a:t>Directory with all renamed .log files and corresponding renamed .zip image stacks</a:t>
               </a:r>
-              <a:endParaRPr lang="en-US" sz="1600" dirty="0"/>
+              <a:endParaRPr lang="en-US" sz="1600" dirty="0">
+                <a:solidFill>
+                  <a:schemeClr val="bg1"/>
+                </a:solidFill>
+              </a:endParaRPr>
             </a:p>
           </p:txBody>
         </p:sp>
       </p:grpSp>
-      <p:sp>
-        <p:nvSpPr>
-          <p:cNvPr id="69" name="TextBox 68"/>
-          <p:cNvSpPr txBox="1"/>
-          <p:nvPr/>
-        </p:nvSpPr>
-        <p:spPr>
-          <a:xfrm>
-            <a:off x="2372415" y="1251249"/>
-            <a:ext cx="1059806" cy="830997"/>
-          </a:xfrm>
-          <a:prstGeom prst="rect">
-            <a:avLst/>
-          </a:prstGeom>
-          <a:noFill/>
-        </p:spPr>
-        <p:txBody>
-          <a:bodyPr wrap="square" rtlCol="0">
-            <a:spAutoFit/>
-          </a:bodyPr>
-          <a:lstStyle/>
-          <a:p>
-            <a:r>
-              <a:rPr lang="en-US" sz="1600" dirty="0" smtClean="0"/>
-              <a:t>For each number in file</a:t>
-            </a:r>
-            <a:endParaRPr lang="en-US" sz="1600" dirty="0" smtClean="0"/>
-          </a:p>
-        </p:txBody>
-      </p:sp>
       <p:grpSp>
         <p:nvGrpSpPr>
           <p:cNvPr id="71" name="Group 70"/>
@@ -4230,8 +4230,8 @@
         </p:nvSpPr>
         <p:spPr>
           <a:xfrm>
-            <a:off x="9662600" y="1926643"/>
-            <a:ext cx="2105411" cy="584775"/>
+            <a:off x="9559464" y="2028570"/>
+            <a:ext cx="2105411" cy="830997"/>
           </a:xfrm>
           <a:prstGeom prst="rect">
             <a:avLst/>
@@ -4246,7 +4246,7 @@
           <a:p>
             <a:r>
               <a:rPr lang="en-US" sz="1600" dirty="0" smtClean="0"/>
-              <a:t>Input for Batch Uploading script</a:t>
+              <a:t>Run Batch Uploading script with this directory as input</a:t>
             </a:r>
             <a:endParaRPr lang="en-US" sz="1600" dirty="0" smtClean="0"/>
           </a:p>
@@ -4558,6 +4558,53 @@
           </a:p>
         </p:txBody>
       </p:sp>
+      <p:sp>
+        <p:nvSpPr>
+          <p:cNvPr id="25" name="Rounded Rectangle 24"/>
+          <p:cNvSpPr/>
+          <p:nvPr/>
+        </p:nvSpPr>
+        <p:spPr>
+          <a:xfrm>
+            <a:off x="3326130" y="103295"/>
+            <a:ext cx="4591690" cy="6640830"/>
+          </a:xfrm>
+          <a:prstGeom prst="roundRect">
+            <a:avLst/>
+          </a:prstGeom>
+          <a:noFill/>
+          <a:ln w="76200">
+            <a:solidFill>
+              <a:schemeClr val="tx1"/>
+            </a:solidFill>
+            <a:prstDash val="sysDot"/>
+          </a:ln>
+        </p:spPr>
+        <p:style>
+          <a:lnRef idx="2">
+            <a:schemeClr val="accent1">
+              <a:shade val="50000"/>
+            </a:schemeClr>
+          </a:lnRef>
+          <a:fillRef idx="1">
+            <a:schemeClr val="accent1"/>
+          </a:fillRef>
+          <a:effectRef idx="0">
+            <a:schemeClr val="accent1"/>
+          </a:effectRef>
+          <a:fontRef idx="minor">
+            <a:schemeClr val="lt1"/>
+          </a:fontRef>
+        </p:style>
+        <p:txBody>
+          <a:bodyPr rtlCol="0" anchor="ctr"/>
+          <a:lstStyle/>
+          <a:p>
+            <a:pPr algn="ctr"/>
+            <a:endParaRPr lang="en-US"/>
+          </a:p>
+        </p:txBody>
+      </p:sp>
     </p:spTree>
     <p:extLst>
       <p:ext uri="{BB962C8B-B14F-4D97-AF65-F5344CB8AC3E}">
@@ -4578,74 +4625,6 @@
 </p:sld>
 </file>
 
-<file path=ppt/slides/slide12.xml><?xml version="1.0" encoding="utf-8"?>
-<p:sld xmlns:a="http://schemas.openxmlformats.org/drawingml/2006/main" xmlns:r="http://schemas.openxmlformats.org/officeDocument/2006/relationships" xmlns:p="http://schemas.openxmlformats.org/presentationml/2006/main">
-  <p:cSld>
-    <p:spTree>
-      <p:nvGrpSpPr>
-        <p:cNvPr id="1" name=""/>
-        <p:cNvGrpSpPr/>
-        <p:nvPr/>
-      </p:nvGrpSpPr>
-      <p:grpSpPr>
-        <a:xfrm>
-          <a:off x="0" y="0"/>
-          <a:ext cx="0" cy="0"/>
-          <a:chOff x="0" y="0"/>
-          <a:chExt cx="0" cy="0"/>
-        </a:xfrm>
-      </p:grpSpPr>
-      <p:sp>
-        <p:nvSpPr>
-          <p:cNvPr id="2" name="Title 1"/>
-          <p:cNvSpPr>
-            <a:spLocks noGrp="1"/>
-          </p:cNvSpPr>
-          <p:nvPr>
-            <p:ph type="title"/>
-          </p:nvPr>
-        </p:nvSpPr>
-        <p:spPr/>
-        <p:txBody>
-          <a:bodyPr/>
-          <a:lstStyle/>
-          <a:p>
-            <a:endParaRPr lang="en-US" dirty="0"/>
-          </a:p>
-        </p:txBody>
-      </p:sp>
-      <p:sp>
-        <p:nvSpPr>
-          <p:cNvPr id="3" name="Content Placeholder 2"/>
-          <p:cNvSpPr>
-            <a:spLocks noGrp="1"/>
-          </p:cNvSpPr>
-          <p:nvPr>
-            <p:ph idx="1"/>
-          </p:nvPr>
-        </p:nvSpPr>
-        <p:spPr/>
-        <p:txBody>
-          <a:bodyPr/>
-          <a:lstStyle/>
-          <a:p>
-            <a:endParaRPr lang="en-US" dirty="0"/>
-          </a:p>
-        </p:txBody>
-      </p:sp>
-    </p:spTree>
-    <p:extLst>
-      <p:ext uri="{BB962C8B-B14F-4D97-AF65-F5344CB8AC3E}">
-        <p14:creationId xmlns:p14="http://schemas.microsoft.com/office/powerpoint/2010/main" val="1387109166"/>
-      </p:ext>
-    </p:extLst>
-  </p:cSld>
-  <p:clrMapOvr>
-    <a:masterClrMapping/>
-  </p:clrMapOvr>
-</p:sld>
-</file>
-
 <file path=ppt/slides/slide2.xml><?xml version="1.0" encoding="utf-8"?>
 <p:sld xmlns:a="http://schemas.openxmlformats.org/drawingml/2006/main" xmlns:r="http://schemas.openxmlformats.org/officeDocument/2006/relationships" xmlns:p="http://schemas.openxmlformats.org/presentationml/2006/main">
   <p:cSld>
@@ -4729,6 +4708,13 @@
   <p:clrMapOvr>
     <a:masterClrMapping/>
   </p:clrMapOvr>
+  <p:timing>
+    <p:tnLst>
+      <p:par>
+        <p:cTn id="1" dur="indefinite" restart="never" nodeType="tmRoot"/>
+      </p:par>
+    </p:tnLst>
+  </p:timing>
 </p:sld>
 </file>
 
@@ -4822,6 +4808,13 @@
   <p:clrMapOvr>
     <a:masterClrMapping/>
   </p:clrMapOvr>
+  <p:timing>
+    <p:tnLst>
+      <p:par>
+        <p:cTn id="1" dur="indefinite" restart="never" nodeType="tmRoot"/>
+      </p:par>
+    </p:tnLst>
+  </p:timing>
 </p:sld>
 </file>
 
@@ -4933,6 +4926,13 @@
   <p:clrMapOvr>
     <a:masterClrMapping/>
   </p:clrMapOvr>
+  <p:timing>
+    <p:tnLst>
+      <p:par>
+        <p:cTn id="1" dur="indefinite" restart="never" nodeType="tmRoot"/>
+      </p:par>
+    </p:tnLst>
+  </p:timing>
 </p:sld>
 </file>
 
@@ -4980,7 +4980,7 @@
             </a:r>
             <a:r>
               <a:rPr lang="en-US" dirty="0" smtClean="0"/>
-              <a:t> Workflow</a:t>
+              <a:t> Workflow using Stacks v 2.2</a:t>
             </a:r>
             <a:endParaRPr lang="en-US" dirty="0"/>
           </a:p>
@@ -8728,6 +8728,13 @@
   <p:clrMapOvr>
     <a:masterClrMapping/>
   </p:clrMapOvr>
+  <p:timing>
+    <p:tnLst>
+      <p:par>
+        <p:cTn id="1" dur="indefinite" restart="never" nodeType="tmRoot"/>
+      </p:par>
+    </p:tnLst>
+  </p:timing>
 </p:sld>
 </file>
 
@@ -8838,6 +8845,13 @@
   <p:clrMapOvr>
     <a:masterClrMapping/>
   </p:clrMapOvr>
+  <p:timing>
+    <p:tnLst>
+      <p:par>
+        <p:cTn id="1" dur="indefinite" restart="never" nodeType="tmRoot"/>
+      </p:par>
+    </p:tnLst>
+  </p:timing>
 </p:sld>
 </file>
 
@@ -8921,6 +8935,13 @@
   <p:clrMapOvr>
     <a:masterClrMapping/>
   </p:clrMapOvr>
+  <p:timing>
+    <p:tnLst>
+      <p:par>
+        <p:cTn id="1" dur="indefinite" restart="never" nodeType="tmRoot"/>
+      </p:par>
+    </p:tnLst>
+  </p:timing>
 </p:sld>
 </file>
 

</xml_diff>